<commit_message>
Adding changes in the presentation
</commit_message>
<xml_diff>
--- a/Apresentação.pptx
+++ b/Apresentação.pptx
@@ -245,7 +245,7 @@
             <a:pPr rtl="0"/>
             <a:fld id="{7FC1664B-5041-443B-91C6-A45B41A6020A}" type="datetime1">
               <a:rPr lang="pt-BR" smtClean="0"/>
-              <a:t>25/03/2022</a:t>
+              <a:t>31/03/2022</a:t>
             </a:fld>
             <a:endParaRPr lang="pt-BR" dirty="0"/>
           </a:p>
@@ -415,7 +415,7 @@
             <a:pPr rtl="0"/>
             <a:fld id="{F842E89D-3709-4A2B-9A3A-76E4CE2900D4}" type="datetime1">
               <a:rPr lang="pt-BR" noProof="0" smtClean="0"/>
-              <a:t>25/03/2022</a:t>
+              <a:t>31/03/2022</a:t>
             </a:fld>
             <a:endParaRPr lang="pt-BR" noProof="0" dirty="0"/>
           </a:p>
@@ -4505,7 +4505,7 @@
             <a:pPr rtl="0"/>
             <a:fld id="{53458F51-A324-4E75-90AA-F203FA9355A0}" type="datetime1">
               <a:rPr lang="pt-BR" noProof="0" smtClean="0"/>
-              <a:t>25/03/2022</a:t>
+              <a:t>31/03/2022</a:t>
             </a:fld>
             <a:endParaRPr lang="pt-BR" noProof="0" dirty="0"/>
           </a:p>
@@ -4629,7 +4629,7 @@
             <a:pPr rtl="0"/>
             <a:fld id="{4C35D16D-7D9B-419D-82E3-F0B9FF9A3A9D}" type="datetime1">
               <a:rPr lang="pt-BR" noProof="0" smtClean="0"/>
-              <a:t>25/03/2022</a:t>
+              <a:t>31/03/2022</a:t>
             </a:fld>
             <a:endParaRPr lang="pt-BR" noProof="0" dirty="0"/>
           </a:p>
@@ -5022,7 +5022,7 @@
             <a:pPr rtl="0"/>
             <a:fld id="{844F27DD-582C-4796-B2D9-46C6D21E31B6}" type="datetime1">
               <a:rPr lang="pt-BR" noProof="0" smtClean="0"/>
-              <a:t>25/03/2022</a:t>
+              <a:t>31/03/2022</a:t>
             </a:fld>
             <a:endParaRPr lang="pt-BR" noProof="0" dirty="0"/>
           </a:p>
@@ -5866,7 +5866,7 @@
             <a:pPr rtl="0"/>
             <a:fld id="{C61B7B32-8B9D-4D80-9F6E-0970D630EE88}" type="datetime1">
               <a:rPr lang="pt-BR" noProof="0" smtClean="0"/>
-              <a:t>25/03/2022</a:t>
+              <a:t>31/03/2022</a:t>
             </a:fld>
             <a:endParaRPr lang="pt-BR" noProof="0" dirty="0"/>
           </a:p>
@@ -6204,7 +6204,7 @@
             <a:pPr rtl="0"/>
             <a:fld id="{FA95F483-0B9E-4DD8-9124-DC336470C76F}" type="datetime1">
               <a:rPr lang="pt-BR" noProof="0" smtClean="0"/>
-              <a:t>25/03/2022</a:t>
+              <a:t>31/03/2022</a:t>
             </a:fld>
             <a:endParaRPr lang="pt-BR" noProof="0" dirty="0"/>
           </a:p>
@@ -6516,7 +6516,7 @@
             <a:pPr rtl="0"/>
             <a:fld id="{E27684DD-BD0D-4412-A976-BC0D80C04437}" type="datetime1">
               <a:rPr lang="pt-BR" noProof="0" smtClean="0"/>
-              <a:t>25/03/2022</a:t>
+              <a:t>31/03/2022</a:t>
             </a:fld>
             <a:endParaRPr lang="pt-BR" noProof="0" dirty="0"/>
           </a:p>
@@ -7115,7 +7115,7 @@
             <a:pPr rtl="0"/>
             <a:fld id="{5D230792-9F8B-479F-B4EA-6C9554157814}" type="datetime1">
               <a:rPr lang="pt-BR" noProof="0" smtClean="0"/>
-              <a:t>25/03/2022</a:t>
+              <a:t>31/03/2022</a:t>
             </a:fld>
             <a:endParaRPr lang="pt-BR" noProof="0" dirty="0"/>
           </a:p>
@@ -7382,7 +7382,7 @@
             <a:pPr rtl="0"/>
             <a:fld id="{5368CB05-7649-41F3-8F7B-A06299C7FC72}" type="datetime1">
               <a:rPr lang="pt-BR" noProof="0" smtClean="0"/>
-              <a:t>25/03/2022</a:t>
+              <a:t>31/03/2022</a:t>
             </a:fld>
             <a:endParaRPr lang="pt-BR" noProof="0" dirty="0"/>
           </a:p>
@@ -7649,7 +7649,7 @@
             <a:pPr rtl="0"/>
             <a:fld id="{26F4223D-1125-49F4-849D-69C7360807E9}" type="datetime1">
               <a:rPr lang="pt-BR" noProof="0" smtClean="0"/>
-              <a:t>25/03/2022</a:t>
+              <a:t>31/03/2022</a:t>
             </a:fld>
             <a:endParaRPr lang="pt-BR" noProof="0" dirty="0"/>
           </a:p>
@@ -8173,7 +8173,7 @@
             <a:pPr rtl="0"/>
             <a:fld id="{6AD52135-AF53-4A9A-A35F-59933B32DBCF}" type="datetime1">
               <a:rPr lang="pt-BR" noProof="0" smtClean="0"/>
-              <a:t>25/03/2022</a:t>
+              <a:t>31/03/2022</a:t>
             </a:fld>
             <a:endParaRPr lang="pt-BR" noProof="0" dirty="0"/>
           </a:p>
@@ -8297,7 +8297,7 @@
             <a:pPr rtl="0"/>
             <a:fld id="{7F812BA4-192F-42D6-B515-396E862C1C8F}" type="datetime1">
               <a:rPr lang="pt-BR" noProof="0" smtClean="0"/>
-              <a:t>25/03/2022</a:t>
+              <a:t>31/03/2022</a:t>
             </a:fld>
             <a:endParaRPr lang="pt-BR" noProof="0" dirty="0"/>
           </a:p>
@@ -8735,7 +8735,7 @@
             <a:pPr rtl="0"/>
             <a:fld id="{A43CB41E-BD29-439B-BF78-A64CBF9A3F58}" type="datetime1">
               <a:rPr lang="pt-BR" noProof="0" smtClean="0"/>
-              <a:t>25/03/2022</a:t>
+              <a:t>31/03/2022</a:t>
             </a:fld>
             <a:endParaRPr lang="pt-BR" noProof="0" dirty="0"/>
           </a:p>
@@ -9282,7 +9282,7 @@
             <a:pPr rtl="0"/>
             <a:fld id="{B6625A12-B868-480C-9272-328493957447}" type="datetime1">
               <a:rPr lang="pt-BR" noProof="0" smtClean="0"/>
-              <a:t>25/03/2022</a:t>
+              <a:t>31/03/2022</a:t>
             </a:fld>
             <a:endParaRPr lang="pt-BR" noProof="0" dirty="0"/>
           </a:p>
@@ -9937,12 +9937,83 @@
           </a:p>
         </p:txBody>
       </p:sp>
+      <p:sp>
+        <p:nvSpPr>
+          <p:cNvPr id="7" name="CaixaDeTexto 6">
+            <a:extLst>
+              <a:ext uri="{FF2B5EF4-FFF2-40B4-BE49-F238E27FC236}">
+                <a16:creationId xmlns:a16="http://schemas.microsoft.com/office/drawing/2014/main" id="{C43AA3BD-5002-4ECF-9DDC-827405807158}"/>
+              </a:ext>
+            </a:extLst>
+          </p:cNvPr>
+          <p:cNvSpPr txBox="1"/>
+          <p:nvPr/>
+        </p:nvSpPr>
+        <p:spPr>
+          <a:xfrm>
+            <a:off x="5363693" y="4170472"/>
+            <a:ext cx="1116011" cy="338554"/>
+          </a:xfrm>
+          <a:prstGeom prst="rect">
+            <a:avLst/>
+          </a:prstGeom>
+          <a:noFill/>
+        </p:spPr>
+        <p:txBody>
+          <a:bodyPr wrap="none" rtlCol="0">
+            <a:spAutoFit/>
+          </a:bodyPr>
+          <a:lstStyle/>
+          <a:p>
+            <a:r>
+              <a:rPr lang="pt-BR" sz="1600" dirty="0"/>
+              <a:t>Fonte: [4]</a:t>
+            </a:r>
+          </a:p>
+        </p:txBody>
+      </p:sp>
+      <p:sp>
+        <p:nvSpPr>
+          <p:cNvPr id="14" name="CaixaDeTexto 13">
+            <a:extLst>
+              <a:ext uri="{FF2B5EF4-FFF2-40B4-BE49-F238E27FC236}">
+                <a16:creationId xmlns:a16="http://schemas.microsoft.com/office/drawing/2014/main" id="{D3A35BD0-FB59-46CE-BAE7-F806A1E5DA0F}"/>
+              </a:ext>
+            </a:extLst>
+          </p:cNvPr>
+          <p:cNvSpPr txBox="1"/>
+          <p:nvPr/>
+        </p:nvSpPr>
+        <p:spPr>
+          <a:xfrm>
+            <a:off x="3972249" y="2174236"/>
+            <a:ext cx="3787693" cy="584775"/>
+          </a:xfrm>
+          <a:prstGeom prst="rect">
+            <a:avLst/>
+          </a:prstGeom>
+          <a:noFill/>
+        </p:spPr>
+        <p:txBody>
+          <a:bodyPr wrap="square" rtlCol="0">
+            <a:spAutoFit/>
+          </a:bodyPr>
+          <a:lstStyle/>
+          <a:p>
+            <a:pPr algn="ctr"/>
+            <a:r>
+              <a:rPr lang="pt-BR" sz="1600" dirty="0"/>
+              <a:t>Horários dos ataques dia 7 de Julho de 2017</a:t>
+            </a:r>
+          </a:p>
+        </p:txBody>
+      </p:sp>
       <p:graphicFrame>
         <p:nvGraphicFramePr>
-          <p:cNvPr id="5" name="Tabela 4">
+          <p:cNvPr id="2" name="Tabela 1">
             <a:extLst>
               <a:ext uri="{FF2B5EF4-FFF2-40B4-BE49-F238E27FC236}">
-                <a16:creationId xmlns:a16="http://schemas.microsoft.com/office/drawing/2014/main" id="{5EB5A3FF-B5EC-43AA-9709-6E0B84E5D6E9}"/>
+                <a16:creationId xmlns:a16="http://schemas.microsoft.com/office/drawing/2014/main" id="{1FFE176B-9C3F-44EE-B64D-A6162954AB93}"/>
               </a:ext>
             </a:extLst>
           </p:cNvPr>
@@ -9952,14 +10023,14 @@
           <p:nvPr>
             <p:extLst>
               <p:ext uri="{D42A27DB-BD31-4B8C-83A1-F6EECF244321}">
-                <p14:modId xmlns:p14="http://schemas.microsoft.com/office/powerpoint/2010/main" val="4117009278"/>
+                <p14:modId xmlns:p14="http://schemas.microsoft.com/office/powerpoint/2010/main" val="1255288818"/>
               </p:ext>
             </p:extLst>
           </p:nvPr>
         </p:nvGraphicFramePr>
         <p:xfrm>
-          <a:off x="2134006" y="2332512"/>
-          <a:ext cx="3787693" cy="2540191"/>
+          <a:off x="3972249" y="2759011"/>
+          <a:ext cx="3898900" cy="1339978"/>
         </p:xfrm>
         <a:graphic>
           <a:graphicData uri="http://schemas.openxmlformats.org/drawingml/2006/table">
@@ -9968,29 +10039,22 @@
                 <a:tableStyleId>{5C22544A-7EE6-4342-B048-85BDC9FD1C3A}</a:tableStyleId>
               </a:tblPr>
               <a:tblGrid>
-                <a:gridCol w="1262427">
+                <a:gridCol w="1949450">
                   <a:extLst>
                     <a:ext uri="{9D8B030D-6E8A-4147-A177-3AD203B41FA5}">
-                      <a16:colId xmlns:a16="http://schemas.microsoft.com/office/drawing/2014/main" val="1241249450"/>
+                      <a16:colId xmlns:a16="http://schemas.microsoft.com/office/drawing/2014/main" val="3643648169"/>
                     </a:ext>
                   </a:extLst>
                 </a:gridCol>
-                <a:gridCol w="1262427">
+                <a:gridCol w="1949450">
                   <a:extLst>
                     <a:ext uri="{9D8B030D-6E8A-4147-A177-3AD203B41FA5}">
-                      <a16:colId xmlns:a16="http://schemas.microsoft.com/office/drawing/2014/main" val="1847979064"/>
-                    </a:ext>
-                  </a:extLst>
-                </a:gridCol>
-                <a:gridCol w="1262839">
-                  <a:extLst>
-                    <a:ext uri="{9D8B030D-6E8A-4147-A177-3AD203B41FA5}">
-                      <a16:colId xmlns:a16="http://schemas.microsoft.com/office/drawing/2014/main" val="2959949953"/>
+                      <a16:colId xmlns:a16="http://schemas.microsoft.com/office/drawing/2014/main" val="2710689134"/>
                     </a:ext>
                   </a:extLst>
                 </a:gridCol>
               </a:tblGrid>
-              <a:tr h="161464">
+              <a:tr h="0">
                 <a:tc>
                   <a:txBody>
                     <a:bodyPr/>
@@ -10005,17 +10069,17 @@
                         </a:spcAft>
                       </a:pPr>
                       <a:r>
-                        <a:rPr lang="pt-BR" sz="1200" dirty="0">
+                        <a:rPr lang="pt-BR" sz="1200">
                           <a:solidFill>
-                            <a:sysClr val="windowText" lastClr="000000"/>
+                            <a:schemeClr val="tx1"/>
                           </a:solidFill>
                           <a:effectLst/>
                         </a:rPr>
-                        <a:t>Dia</a:t>
+                        <a:t>Tipo de Ataque</a:t>
                       </a:r>
-                      <a:endParaRPr lang="pt-BR" sz="1200" dirty="0">
+                      <a:endParaRPr lang="pt-BR" sz="1200">
                         <a:solidFill>
-                          <a:sysClr val="windowText" lastClr="000000"/>
+                          <a:schemeClr val="tx1"/>
                         </a:solidFill>
                         <a:effectLst/>
                         <a:latin typeface="Times New Roman" panose="02020603050405020304" pitchFamily="18" charset="0"/>
@@ -10024,44 +10088,7 @@
                       </a:endParaRPr>
                     </a:p>
                   </a:txBody>
-                  <a:tcPr marL="44634" marR="44634" marT="0" marB="0">
-                    <a:lnL w="12700" cap="flat" cmpd="sng" algn="ctr">
-                      <a:solidFill>
-                        <a:schemeClr val="tx1"/>
-                      </a:solidFill>
-                      <a:prstDash val="solid"/>
-                      <a:round/>
-                      <a:headEnd type="none" w="med" len="med"/>
-                      <a:tailEnd type="none" w="med" len="med"/>
-                    </a:lnL>
-                    <a:lnR w="12700" cap="flat" cmpd="sng" algn="ctr">
-                      <a:solidFill>
-                        <a:schemeClr val="tx1"/>
-                      </a:solidFill>
-                      <a:prstDash val="solid"/>
-                      <a:round/>
-                      <a:headEnd type="none" w="med" len="med"/>
-                      <a:tailEnd type="none" w="med" len="med"/>
-                    </a:lnR>
-                    <a:lnT w="12700" cap="flat" cmpd="sng" algn="ctr">
-                      <a:solidFill>
-                        <a:schemeClr val="tx1"/>
-                      </a:solidFill>
-                      <a:prstDash val="solid"/>
-                      <a:round/>
-                      <a:headEnd type="none" w="med" len="med"/>
-                      <a:tailEnd type="none" w="med" len="med"/>
-                    </a:lnT>
-                    <a:lnB w="12700" cap="flat" cmpd="sng" algn="ctr">
-                      <a:solidFill>
-                        <a:schemeClr val="tx1"/>
-                      </a:solidFill>
-                      <a:prstDash val="solid"/>
-                      <a:round/>
-                      <a:headEnd type="none" w="med" len="med"/>
-                      <a:tailEnd type="none" w="med" len="med"/>
-                    </a:lnB>
-                  </a:tcPr>
+                  <a:tcPr marL="68580" marR="68580" marT="0" marB="0"/>
                 </a:tc>
                 <a:tc>
                   <a:txBody>
@@ -10077,26 +10104,17 @@
                         </a:spcAft>
                       </a:pPr>
                       <a:r>
-                        <a:rPr lang="pt-BR" sz="1200" dirty="0">
+                        <a:rPr lang="pt-BR" sz="1200">
                           <a:solidFill>
-                            <a:sysClr val="windowText" lastClr="000000"/>
+                            <a:schemeClr val="tx1"/>
                           </a:solidFill>
                           <a:effectLst/>
                         </a:rPr>
-                        <a:t>Tipo de Ataque </a:t>
+                        <a:t>Período do Ataque</a:t>
                       </a:r>
-                      <a:r>
-                        <a:rPr lang="pt-BR" sz="1200" dirty="0" err="1">
-                          <a:solidFill>
-                            <a:sysClr val="windowText" lastClr="000000"/>
-                          </a:solidFill>
-                          <a:effectLst/>
-                        </a:rPr>
-                        <a:t>DDoS</a:t>
-                      </a:r>
-                      <a:endParaRPr lang="pt-BR" sz="1200" dirty="0">
+                      <a:endParaRPr lang="pt-BR" sz="1200">
                         <a:solidFill>
-                          <a:sysClr val="windowText" lastClr="000000"/>
+                          <a:schemeClr val="tx1"/>
                         </a:solidFill>
                         <a:effectLst/>
                         <a:latin typeface="Times New Roman" panose="02020603050405020304" pitchFamily="18" charset="0"/>
@@ -10105,44 +10123,77 @@
                       </a:endParaRPr>
                     </a:p>
                   </a:txBody>
-                  <a:tcPr marL="44634" marR="44634" marT="0" marB="0">
-                    <a:lnL w="12700" cap="flat" cmpd="sng" algn="ctr">
-                      <a:solidFill>
-                        <a:schemeClr val="tx1"/>
-                      </a:solidFill>
-                      <a:prstDash val="solid"/>
-                      <a:round/>
-                      <a:headEnd type="none" w="med" len="med"/>
-                      <a:tailEnd type="none" w="med" len="med"/>
-                    </a:lnL>
-                    <a:lnR w="12700" cap="flat" cmpd="sng" algn="ctr">
-                      <a:solidFill>
-                        <a:schemeClr val="tx1"/>
-                      </a:solidFill>
-                      <a:prstDash val="solid"/>
-                      <a:round/>
-                      <a:headEnd type="none" w="med" len="med"/>
-                      <a:tailEnd type="none" w="med" len="med"/>
-                    </a:lnR>
-                    <a:lnT w="12700" cap="flat" cmpd="sng" algn="ctr">
-                      <a:solidFill>
-                        <a:schemeClr val="tx1"/>
-                      </a:solidFill>
-                      <a:prstDash val="solid"/>
-                      <a:round/>
-                      <a:headEnd type="none" w="med" len="med"/>
-                      <a:tailEnd type="none" w="med" len="med"/>
-                    </a:lnT>
-                    <a:lnB w="12700" cap="flat" cmpd="sng" algn="ctr">
-                      <a:solidFill>
-                        <a:schemeClr val="tx1"/>
-                      </a:solidFill>
-                      <a:prstDash val="solid"/>
-                      <a:round/>
-                      <a:headEnd type="none" w="med" len="med"/>
-                      <a:tailEnd type="none" w="med" len="med"/>
-                    </a:lnB>
-                  </a:tcPr>
+                  <a:tcPr marL="68580" marR="68580" marT="0" marB="0"/>
+                </a:tc>
+                <a:extLst>
+                  <a:ext uri="{0D108BD9-81ED-4DB2-BD59-A6C34878D82A}">
+                    <a16:rowId xmlns:a16="http://schemas.microsoft.com/office/drawing/2014/main" val="1743770824"/>
+                  </a:ext>
+                </a:extLst>
+              </a:tr>
+              <a:tr h="0">
+                <a:tc>
+                  <a:txBody>
+                    <a:bodyPr/>
+                    <a:lstStyle/>
+                    <a:p>
+                      <a:pPr algn="ctr">
+                        <a:lnSpc>
+                          <a:spcPct val="150000"/>
+                        </a:lnSpc>
+                        <a:spcAft>
+                          <a:spcPts val="800"/>
+                        </a:spcAft>
+                      </a:pPr>
+                      <a:r>
+                        <a:rPr lang="pt-BR" sz="1200" dirty="0" err="1">
+                          <a:solidFill>
+                            <a:schemeClr val="tx1"/>
+                          </a:solidFill>
+                          <a:effectLst/>
+                        </a:rPr>
+                        <a:t>Botnet</a:t>
+                      </a:r>
+                      <a:r>
+                        <a:rPr lang="pt-BR" sz="1200" dirty="0">
+                          <a:solidFill>
+                            <a:schemeClr val="tx1"/>
+                          </a:solidFill>
+                          <a:effectLst/>
+                        </a:rPr>
+                        <a:t> ARES</a:t>
+                      </a:r>
+                    </a:p>
+                    <a:p>
+                      <a:pPr algn="ctr">
+                        <a:lnSpc>
+                          <a:spcPct val="150000"/>
+                        </a:lnSpc>
+                        <a:spcAft>
+                          <a:spcPts val="800"/>
+                        </a:spcAft>
+                      </a:pPr>
+                      <a:r>
+                        <a:rPr lang="pt-BR" sz="1200" dirty="0">
+                          <a:solidFill>
+                            <a:schemeClr val="tx1"/>
+                          </a:solidFill>
+                          <a:effectLst/>
+                        </a:rPr>
+                        <a:t> </a:t>
+                      </a:r>
+                      <a:endParaRPr lang="pt-BR" sz="1200" dirty="0">
+                        <a:solidFill>
+                          <a:schemeClr val="tx1"/>
+                        </a:solidFill>
+                        <a:effectLst/>
+                        <a:latin typeface="Times New Roman" panose="02020603050405020304" pitchFamily="18" charset="0"/>
+                        <a:ea typeface="Times New Roman" panose="02020603050405020304" pitchFamily="18" charset="0"/>
+                        <a:cs typeface="Times New Roman" panose="02020603050405020304" pitchFamily="18" charset="0"/>
+                      </a:endParaRPr>
+                    </a:p>
+                  </a:txBody>
+                  <a:tcPr marL="68580" marR="68580" marT="0" marB="0"/>
                 </a:tc>
                 <a:tc>
                   <a:txBody>
@@ -10158,17 +10209,17 @@
                         </a:spcAft>
                       </a:pPr>
                       <a:r>
-                        <a:rPr lang="pt-BR" sz="1200" dirty="0">
+                        <a:rPr lang="pt-BR" sz="1200">
                           <a:solidFill>
-                            <a:sysClr val="windowText" lastClr="000000"/>
+                            <a:schemeClr val="tx1"/>
                           </a:solidFill>
                           <a:effectLst/>
                         </a:rPr>
-                        <a:t>Horário dos ataques</a:t>
+                        <a:t>10:02 - 11:02</a:t>
                       </a:r>
-                      <a:endParaRPr lang="pt-BR" sz="1200" dirty="0">
+                      <a:endParaRPr lang="pt-BR" sz="1200">
                         <a:solidFill>
-                          <a:sysClr val="windowText" lastClr="000000"/>
+                          <a:schemeClr val="tx1"/>
                         </a:solidFill>
                         <a:effectLst/>
                         <a:latin typeface="Times New Roman" panose="02020603050405020304" pitchFamily="18" charset="0"/>
@@ -10177,52 +10228,15 @@
                       </a:endParaRPr>
                     </a:p>
                   </a:txBody>
-                  <a:tcPr marL="44634" marR="44634" marT="0" marB="0">
-                    <a:lnL w="12700" cap="flat" cmpd="sng" algn="ctr">
-                      <a:solidFill>
-                        <a:schemeClr val="tx1"/>
-                      </a:solidFill>
-                      <a:prstDash val="solid"/>
-                      <a:round/>
-                      <a:headEnd type="none" w="med" len="med"/>
-                      <a:tailEnd type="none" w="med" len="med"/>
-                    </a:lnL>
-                    <a:lnR w="12700" cap="flat" cmpd="sng" algn="ctr">
-                      <a:solidFill>
-                        <a:schemeClr val="tx1"/>
-                      </a:solidFill>
-                      <a:prstDash val="solid"/>
-                      <a:round/>
-                      <a:headEnd type="none" w="med" len="med"/>
-                      <a:tailEnd type="none" w="med" len="med"/>
-                    </a:lnR>
-                    <a:lnT w="12700" cap="flat" cmpd="sng" algn="ctr">
-                      <a:solidFill>
-                        <a:schemeClr val="tx1"/>
-                      </a:solidFill>
-                      <a:prstDash val="solid"/>
-                      <a:round/>
-                      <a:headEnd type="none" w="med" len="med"/>
-                      <a:tailEnd type="none" w="med" len="med"/>
-                    </a:lnT>
-                    <a:lnB w="12700" cap="flat" cmpd="sng" algn="ctr">
-                      <a:solidFill>
-                        <a:schemeClr val="tx1"/>
-                      </a:solidFill>
-                      <a:prstDash val="solid"/>
-                      <a:round/>
-                      <a:headEnd type="none" w="med" len="med"/>
-                      <a:tailEnd type="none" w="med" len="med"/>
-                    </a:lnB>
-                  </a:tcPr>
+                  <a:tcPr marL="68580" marR="68580" marT="0" marB="0"/>
                 </a:tc>
                 <a:extLst>
                   <a:ext uri="{0D108BD9-81ED-4DB2-BD59-A6C34878D82A}">
-                    <a16:rowId xmlns:a16="http://schemas.microsoft.com/office/drawing/2014/main" val="2640114858"/>
+                    <a16:rowId xmlns:a16="http://schemas.microsoft.com/office/drawing/2014/main" val="2671241967"/>
                   </a:ext>
                 </a:extLst>
               </a:tr>
-              <a:tr h="1560712">
+              <a:tr h="0">
                 <a:tc>
                   <a:txBody>
                     <a:bodyPr/>
@@ -10237,36 +10251,17 @@
                         </a:spcAft>
                       </a:pPr>
                       <a:r>
-                        <a:rPr lang="pt-BR" sz="1200" dirty="0">
+                        <a:rPr lang="en-US" sz="1200">
                           <a:solidFill>
-                            <a:sysClr val="windowText" lastClr="000000"/>
+                            <a:schemeClr val="tx1"/>
                           </a:solidFill>
                           <a:effectLst/>
                         </a:rPr>
-                        <a:t>1</a:t>
+                        <a:t>Port Scan</a:t>
                       </a:r>
-                    </a:p>
-                    <a:p>
-                      <a:pPr algn="ctr">
-                        <a:lnSpc>
-                          <a:spcPct val="150000"/>
-                        </a:lnSpc>
-                        <a:spcAft>
-                          <a:spcPts val="800"/>
-                        </a:spcAft>
-                      </a:pPr>
-                      <a:r>
-                        <a:rPr lang="pt-BR" sz="1200" dirty="0">
-                          <a:solidFill>
-                            <a:sysClr val="windowText" lastClr="000000"/>
-                          </a:solidFill>
-                          <a:effectLst/>
-                        </a:rPr>
-                        <a:t> </a:t>
-                      </a:r>
-                      <a:endParaRPr lang="pt-BR" sz="1200" dirty="0">
+                      <a:endParaRPr lang="pt-BR" sz="1200">
                         <a:solidFill>
-                          <a:sysClr val="windowText" lastClr="000000"/>
+                          <a:schemeClr val="tx1"/>
                         </a:solidFill>
                         <a:effectLst/>
                         <a:latin typeface="Times New Roman" panose="02020603050405020304" pitchFamily="18" charset="0"/>
@@ -10275,582 +10270,7 @@
                       </a:endParaRPr>
                     </a:p>
                   </a:txBody>
-                  <a:tcPr marL="44634" marR="44634" marT="0" marB="0">
-                    <a:lnL w="12700" cap="flat" cmpd="sng" algn="ctr">
-                      <a:solidFill>
-                        <a:schemeClr val="tx1"/>
-                      </a:solidFill>
-                      <a:prstDash val="solid"/>
-                      <a:round/>
-                      <a:headEnd type="none" w="med" len="med"/>
-                      <a:tailEnd type="none" w="med" len="med"/>
-                    </a:lnL>
-                    <a:lnR w="12700" cap="flat" cmpd="sng" algn="ctr">
-                      <a:solidFill>
-                        <a:schemeClr val="tx1"/>
-                      </a:solidFill>
-                      <a:prstDash val="solid"/>
-                      <a:round/>
-                      <a:headEnd type="none" w="med" len="med"/>
-                      <a:tailEnd type="none" w="med" len="med"/>
-                    </a:lnR>
-                    <a:lnT w="12700" cap="flat" cmpd="sng" algn="ctr">
-                      <a:solidFill>
-                        <a:schemeClr val="tx1"/>
-                      </a:solidFill>
-                      <a:prstDash val="solid"/>
-                      <a:round/>
-                      <a:headEnd type="none" w="med" len="med"/>
-                      <a:tailEnd type="none" w="med" len="med"/>
-                    </a:lnT>
-                    <a:lnB w="12700" cap="flat" cmpd="sng" algn="ctr">
-                      <a:solidFill>
-                        <a:schemeClr val="tx1"/>
-                      </a:solidFill>
-                      <a:prstDash val="solid"/>
-                      <a:round/>
-                      <a:headEnd type="none" w="med" len="med"/>
-                      <a:tailEnd type="none" w="med" len="med"/>
-                    </a:lnB>
-                  </a:tcPr>
-                </a:tc>
-                <a:tc>
-                  <a:txBody>
-                    <a:bodyPr/>
-                    <a:lstStyle/>
-                    <a:p>
-                      <a:pPr algn="ctr">
-                        <a:lnSpc>
-                          <a:spcPct val="107000"/>
-                        </a:lnSpc>
-                        <a:spcAft>
-                          <a:spcPts val="800"/>
-                        </a:spcAft>
-                      </a:pPr>
-                      <a:r>
-                        <a:rPr lang="pt-BR" sz="1200">
-                          <a:solidFill>
-                            <a:sysClr val="windowText" lastClr="000000"/>
-                          </a:solidFill>
-                          <a:effectLst/>
-                        </a:rPr>
-                        <a:t>PortMap</a:t>
-                      </a:r>
-                    </a:p>
-                    <a:p>
-                      <a:pPr algn="ctr">
-                        <a:lnSpc>
-                          <a:spcPct val="107000"/>
-                        </a:lnSpc>
-                        <a:spcAft>
-                          <a:spcPts val="800"/>
-                        </a:spcAft>
-                      </a:pPr>
-                      <a:r>
-                        <a:rPr lang="pt-BR" sz="1200">
-                          <a:solidFill>
-                            <a:sysClr val="windowText" lastClr="000000"/>
-                          </a:solidFill>
-                          <a:effectLst/>
-                        </a:rPr>
-                        <a:t>NetBIOS</a:t>
-                      </a:r>
-                    </a:p>
-                    <a:p>
-                      <a:pPr algn="ctr">
-                        <a:lnSpc>
-                          <a:spcPct val="107000"/>
-                        </a:lnSpc>
-                        <a:spcAft>
-                          <a:spcPts val="800"/>
-                        </a:spcAft>
-                      </a:pPr>
-                      <a:r>
-                        <a:rPr lang="pt-BR" sz="1200">
-                          <a:solidFill>
-                            <a:sysClr val="windowText" lastClr="000000"/>
-                          </a:solidFill>
-                          <a:effectLst/>
-                        </a:rPr>
-                        <a:t>LDAP</a:t>
-                      </a:r>
-                    </a:p>
-                    <a:p>
-                      <a:pPr algn="ctr">
-                        <a:lnSpc>
-                          <a:spcPct val="107000"/>
-                        </a:lnSpc>
-                        <a:spcAft>
-                          <a:spcPts val="800"/>
-                        </a:spcAft>
-                      </a:pPr>
-                      <a:r>
-                        <a:rPr lang="pt-BR" sz="1200">
-                          <a:solidFill>
-                            <a:sysClr val="windowText" lastClr="000000"/>
-                          </a:solidFill>
-                          <a:effectLst/>
-                        </a:rPr>
-                        <a:t>MSSQL</a:t>
-                      </a:r>
-                    </a:p>
-                    <a:p>
-                      <a:pPr algn="ctr">
-                        <a:lnSpc>
-                          <a:spcPct val="107000"/>
-                        </a:lnSpc>
-                        <a:spcAft>
-                          <a:spcPts val="800"/>
-                        </a:spcAft>
-                      </a:pPr>
-                      <a:r>
-                        <a:rPr lang="pt-BR" sz="1200">
-                          <a:solidFill>
-                            <a:sysClr val="windowText" lastClr="000000"/>
-                          </a:solidFill>
-                          <a:effectLst/>
-                        </a:rPr>
-                        <a:t>UDP</a:t>
-                      </a:r>
-                    </a:p>
-                    <a:p>
-                      <a:pPr algn="ctr">
-                        <a:lnSpc>
-                          <a:spcPct val="107000"/>
-                        </a:lnSpc>
-                        <a:spcAft>
-                          <a:spcPts val="800"/>
-                        </a:spcAft>
-                      </a:pPr>
-                      <a:r>
-                        <a:rPr lang="pt-BR" sz="1200">
-                          <a:solidFill>
-                            <a:sysClr val="windowText" lastClr="000000"/>
-                          </a:solidFill>
-                          <a:effectLst/>
-                        </a:rPr>
-                        <a:t>UDP-Lag</a:t>
-                      </a:r>
-                    </a:p>
-                    <a:p>
-                      <a:pPr algn="ctr">
-                        <a:lnSpc>
-                          <a:spcPct val="150000"/>
-                        </a:lnSpc>
-                        <a:spcAft>
-                          <a:spcPts val="800"/>
-                        </a:spcAft>
-                      </a:pPr>
-                      <a:r>
-                        <a:rPr lang="pt-BR" sz="1200">
-                          <a:solidFill>
-                            <a:sysClr val="windowText" lastClr="000000"/>
-                          </a:solidFill>
-                          <a:effectLst/>
-                        </a:rPr>
-                        <a:t>SYN</a:t>
-                      </a:r>
-                      <a:endParaRPr lang="pt-BR" sz="1200">
-                        <a:solidFill>
-                          <a:sysClr val="windowText" lastClr="000000"/>
-                        </a:solidFill>
-                        <a:effectLst/>
-                        <a:latin typeface="Times New Roman" panose="02020603050405020304" pitchFamily="18" charset="0"/>
-                        <a:ea typeface="Times New Roman" panose="02020603050405020304" pitchFamily="18" charset="0"/>
-                        <a:cs typeface="Times New Roman" panose="02020603050405020304" pitchFamily="18" charset="0"/>
-                      </a:endParaRPr>
-                    </a:p>
-                  </a:txBody>
-                  <a:tcPr marL="44634" marR="44634" marT="0" marB="0">
-                    <a:lnL w="12700" cap="flat" cmpd="sng" algn="ctr">
-                      <a:solidFill>
-                        <a:schemeClr val="tx1"/>
-                      </a:solidFill>
-                      <a:prstDash val="solid"/>
-                      <a:round/>
-                      <a:headEnd type="none" w="med" len="med"/>
-                      <a:tailEnd type="none" w="med" len="med"/>
-                    </a:lnL>
-                    <a:lnR w="12700" cap="flat" cmpd="sng" algn="ctr">
-                      <a:solidFill>
-                        <a:schemeClr val="tx1"/>
-                      </a:solidFill>
-                      <a:prstDash val="solid"/>
-                      <a:round/>
-                      <a:headEnd type="none" w="med" len="med"/>
-                      <a:tailEnd type="none" w="med" len="med"/>
-                    </a:lnR>
-                    <a:lnT w="12700" cap="flat" cmpd="sng" algn="ctr">
-                      <a:solidFill>
-                        <a:schemeClr val="tx1"/>
-                      </a:solidFill>
-                      <a:prstDash val="solid"/>
-                      <a:round/>
-                      <a:headEnd type="none" w="med" len="med"/>
-                      <a:tailEnd type="none" w="med" len="med"/>
-                    </a:lnT>
-                    <a:lnB w="12700" cap="flat" cmpd="sng" algn="ctr">
-                      <a:solidFill>
-                        <a:schemeClr val="tx1"/>
-                      </a:solidFill>
-                      <a:prstDash val="solid"/>
-                      <a:round/>
-                      <a:headEnd type="none" w="med" len="med"/>
-                      <a:tailEnd type="none" w="med" len="med"/>
-                    </a:lnB>
-                  </a:tcPr>
-                </a:tc>
-                <a:tc>
-                  <a:txBody>
-                    <a:bodyPr/>
-                    <a:lstStyle/>
-                    <a:p>
-                      <a:pPr algn="ctr">
-                        <a:lnSpc>
-                          <a:spcPct val="107000"/>
-                        </a:lnSpc>
-                        <a:spcAft>
-                          <a:spcPts val="800"/>
-                        </a:spcAft>
-                      </a:pPr>
-                      <a:r>
-                        <a:rPr lang="en-US" sz="1200" dirty="0">
-                          <a:solidFill>
-                            <a:sysClr val="windowText" lastClr="000000"/>
-                          </a:solidFill>
-                          <a:effectLst/>
-                        </a:rPr>
-                        <a:t>9:43 - 9:51</a:t>
-                      </a:r>
-                      <a:endParaRPr lang="pt-BR" sz="1200" dirty="0">
-                        <a:solidFill>
-                          <a:sysClr val="windowText" lastClr="000000"/>
-                        </a:solidFill>
-                        <a:effectLst/>
-                      </a:endParaRPr>
-                    </a:p>
-                    <a:p>
-                      <a:pPr algn="ctr">
-                        <a:lnSpc>
-                          <a:spcPct val="107000"/>
-                        </a:lnSpc>
-                        <a:spcAft>
-                          <a:spcPts val="800"/>
-                        </a:spcAft>
-                      </a:pPr>
-                      <a:r>
-                        <a:rPr lang="en-US" sz="1200" dirty="0">
-                          <a:solidFill>
-                            <a:sysClr val="windowText" lastClr="000000"/>
-                          </a:solidFill>
-                          <a:effectLst/>
-                        </a:rPr>
-                        <a:t>10:00 - 10:09</a:t>
-                      </a:r>
-                      <a:endParaRPr lang="pt-BR" sz="1200" dirty="0">
-                        <a:solidFill>
-                          <a:sysClr val="windowText" lastClr="000000"/>
-                        </a:solidFill>
-                        <a:effectLst/>
-                      </a:endParaRPr>
-                    </a:p>
-                    <a:p>
-                      <a:pPr algn="ctr">
-                        <a:lnSpc>
-                          <a:spcPct val="107000"/>
-                        </a:lnSpc>
-                        <a:spcAft>
-                          <a:spcPts val="800"/>
-                        </a:spcAft>
-                      </a:pPr>
-                      <a:r>
-                        <a:rPr lang="en-US" sz="1200" dirty="0">
-                          <a:solidFill>
-                            <a:sysClr val="windowText" lastClr="000000"/>
-                          </a:solidFill>
-                          <a:effectLst/>
-                        </a:rPr>
-                        <a:t>10:21 - 10:30</a:t>
-                      </a:r>
-                      <a:endParaRPr lang="pt-BR" sz="1200" dirty="0">
-                        <a:solidFill>
-                          <a:sysClr val="windowText" lastClr="000000"/>
-                        </a:solidFill>
-                        <a:effectLst/>
-                      </a:endParaRPr>
-                    </a:p>
-                    <a:p>
-                      <a:pPr algn="ctr">
-                        <a:lnSpc>
-                          <a:spcPct val="107000"/>
-                        </a:lnSpc>
-                        <a:spcAft>
-                          <a:spcPts val="800"/>
-                        </a:spcAft>
-                      </a:pPr>
-                      <a:r>
-                        <a:rPr lang="en-US" sz="1200" dirty="0">
-                          <a:solidFill>
-                            <a:sysClr val="windowText" lastClr="000000"/>
-                          </a:solidFill>
-                          <a:effectLst/>
-                        </a:rPr>
-                        <a:t>10:33 - 10:42</a:t>
-                      </a:r>
-                      <a:endParaRPr lang="pt-BR" sz="1200" dirty="0">
-                        <a:solidFill>
-                          <a:sysClr val="windowText" lastClr="000000"/>
-                        </a:solidFill>
-                        <a:effectLst/>
-                      </a:endParaRPr>
-                    </a:p>
-                    <a:p>
-                      <a:pPr algn="ctr">
-                        <a:lnSpc>
-                          <a:spcPct val="107000"/>
-                        </a:lnSpc>
-                        <a:spcAft>
-                          <a:spcPts val="800"/>
-                        </a:spcAft>
-                      </a:pPr>
-                      <a:r>
-                        <a:rPr lang="en-US" sz="1200" dirty="0">
-                          <a:solidFill>
-                            <a:sysClr val="windowText" lastClr="000000"/>
-                          </a:solidFill>
-                          <a:effectLst/>
-                        </a:rPr>
-                        <a:t>10:53 - 11:03</a:t>
-                      </a:r>
-                      <a:endParaRPr lang="pt-BR" sz="1200" dirty="0">
-                        <a:solidFill>
-                          <a:sysClr val="windowText" lastClr="000000"/>
-                        </a:solidFill>
-                        <a:effectLst/>
-                      </a:endParaRPr>
-                    </a:p>
-                    <a:p>
-                      <a:pPr algn="ctr">
-                        <a:lnSpc>
-                          <a:spcPct val="107000"/>
-                        </a:lnSpc>
-                        <a:spcAft>
-                          <a:spcPts val="800"/>
-                        </a:spcAft>
-                      </a:pPr>
-                      <a:r>
-                        <a:rPr lang="en-US" sz="1200" dirty="0">
-                          <a:solidFill>
-                            <a:sysClr val="windowText" lastClr="000000"/>
-                          </a:solidFill>
-                          <a:effectLst/>
-                        </a:rPr>
-                        <a:t>11:14 - 11:24</a:t>
-                      </a:r>
-                      <a:endParaRPr lang="pt-BR" sz="1200" dirty="0">
-                        <a:solidFill>
-                          <a:sysClr val="windowText" lastClr="000000"/>
-                        </a:solidFill>
-                        <a:effectLst/>
-                      </a:endParaRPr>
-                    </a:p>
-                    <a:p>
-                      <a:pPr algn="ctr">
-                        <a:lnSpc>
-                          <a:spcPct val="150000"/>
-                        </a:lnSpc>
-                        <a:spcAft>
-                          <a:spcPts val="800"/>
-                        </a:spcAft>
-                      </a:pPr>
-                      <a:r>
-                        <a:rPr lang="en-US" sz="1200" dirty="0">
-                          <a:solidFill>
-                            <a:sysClr val="windowText" lastClr="000000"/>
-                          </a:solidFill>
-                          <a:effectLst/>
-                        </a:rPr>
-                        <a:t>11:28 - 17:35</a:t>
-                      </a:r>
-                      <a:endParaRPr lang="pt-BR" sz="1200" dirty="0">
-                        <a:solidFill>
-                          <a:sysClr val="windowText" lastClr="000000"/>
-                        </a:solidFill>
-                        <a:effectLst/>
-                        <a:latin typeface="Times New Roman" panose="02020603050405020304" pitchFamily="18" charset="0"/>
-                        <a:ea typeface="Times New Roman" panose="02020603050405020304" pitchFamily="18" charset="0"/>
-                        <a:cs typeface="Times New Roman" panose="02020603050405020304" pitchFamily="18" charset="0"/>
-                      </a:endParaRPr>
-                    </a:p>
-                  </a:txBody>
-                  <a:tcPr marL="44634" marR="44634" marT="0" marB="0">
-                    <a:lnL w="12700" cap="flat" cmpd="sng" algn="ctr">
-                      <a:solidFill>
-                        <a:schemeClr val="tx1"/>
-                      </a:solidFill>
-                      <a:prstDash val="solid"/>
-                      <a:round/>
-                      <a:headEnd type="none" w="med" len="med"/>
-                      <a:tailEnd type="none" w="med" len="med"/>
-                    </a:lnL>
-                    <a:lnR w="12700" cap="flat" cmpd="sng" algn="ctr">
-                      <a:solidFill>
-                        <a:schemeClr val="tx1"/>
-                      </a:solidFill>
-                      <a:prstDash val="solid"/>
-                      <a:round/>
-                      <a:headEnd type="none" w="med" len="med"/>
-                      <a:tailEnd type="none" w="med" len="med"/>
-                    </a:lnR>
-                    <a:lnT w="12700" cap="flat" cmpd="sng" algn="ctr">
-                      <a:solidFill>
-                        <a:schemeClr val="tx1"/>
-                      </a:solidFill>
-                      <a:prstDash val="solid"/>
-                      <a:round/>
-                      <a:headEnd type="none" w="med" len="med"/>
-                      <a:tailEnd type="none" w="med" len="med"/>
-                    </a:lnT>
-                    <a:lnB w="12700" cap="flat" cmpd="sng" algn="ctr">
-                      <a:solidFill>
-                        <a:schemeClr val="tx1"/>
-                      </a:solidFill>
-                      <a:prstDash val="solid"/>
-                      <a:round/>
-                      <a:headEnd type="none" w="med" len="med"/>
-                      <a:tailEnd type="none" w="med" len="med"/>
-                    </a:lnB>
-                  </a:tcPr>
-                </a:tc>
-                <a:extLst>
-                  <a:ext uri="{0D108BD9-81ED-4DB2-BD59-A6C34878D82A}">
-                    <a16:rowId xmlns:a16="http://schemas.microsoft.com/office/drawing/2014/main" val="2697177599"/>
-                  </a:ext>
-                </a:extLst>
-              </a:tr>
-            </a:tbl>
-          </a:graphicData>
-        </a:graphic>
-      </p:graphicFrame>
-      <p:graphicFrame>
-        <p:nvGraphicFramePr>
-          <p:cNvPr id="6" name="Tabela 5">
-            <a:extLst>
-              <a:ext uri="{FF2B5EF4-FFF2-40B4-BE49-F238E27FC236}">
-                <a16:creationId xmlns:a16="http://schemas.microsoft.com/office/drawing/2014/main" id="{668B9715-C81B-442C-A9AD-840384790F7E}"/>
-              </a:ext>
-            </a:extLst>
-          </p:cNvPr>
-          <p:cNvGraphicFramePr>
-            <a:graphicFrameLocks noGrp="1"/>
-          </p:cNvGraphicFramePr>
-          <p:nvPr>
-            <p:extLst>
-              <p:ext uri="{D42A27DB-BD31-4B8C-83A1-F6EECF244321}">
-                <p14:modId xmlns:p14="http://schemas.microsoft.com/office/powerpoint/2010/main" val="2203682092"/>
-              </p:ext>
-            </p:extLst>
-          </p:nvPr>
-        </p:nvGraphicFramePr>
-        <p:xfrm>
-          <a:off x="7190165" y="1589245"/>
-          <a:ext cx="3473449" cy="4026726"/>
-        </p:xfrm>
-        <a:graphic>
-          <a:graphicData uri="http://schemas.openxmlformats.org/drawingml/2006/table">
-            <a:tbl>
-              <a:tblPr firstRow="1" firstCol="1" bandRow="1">
-                <a:tableStyleId>{5C22544A-7EE6-4342-B048-85BDC9FD1C3A}</a:tableStyleId>
-              </a:tblPr>
-              <a:tblGrid>
-                <a:gridCol w="1120263">
-                  <a:extLst>
-                    <a:ext uri="{9D8B030D-6E8A-4147-A177-3AD203B41FA5}">
-                      <a16:colId xmlns:a16="http://schemas.microsoft.com/office/drawing/2014/main" val="3202254557"/>
-                    </a:ext>
-                  </a:extLst>
-                </a:gridCol>
-                <a:gridCol w="1176401">
-                  <a:extLst>
-                    <a:ext uri="{9D8B030D-6E8A-4147-A177-3AD203B41FA5}">
-                      <a16:colId xmlns:a16="http://schemas.microsoft.com/office/drawing/2014/main" val="4077564764"/>
-                    </a:ext>
-                  </a:extLst>
-                </a:gridCol>
-                <a:gridCol w="1176785">
-                  <a:extLst>
-                    <a:ext uri="{9D8B030D-6E8A-4147-A177-3AD203B41FA5}">
-                      <a16:colId xmlns:a16="http://schemas.microsoft.com/office/drawing/2014/main" val="77989115"/>
-                    </a:ext>
-                  </a:extLst>
-                </a:gridCol>
-              </a:tblGrid>
-              <a:tr h="317679">
-                <a:tc>
-                  <a:txBody>
-                    <a:bodyPr/>
-                    <a:lstStyle/>
-                    <a:p>
-                      <a:pPr algn="ctr">
-                        <a:lnSpc>
-                          <a:spcPct val="150000"/>
-                        </a:lnSpc>
-                        <a:spcAft>
-                          <a:spcPts val="800"/>
-                        </a:spcAft>
-                      </a:pPr>
-                      <a:r>
-                        <a:rPr lang="pt-BR" sz="1200" dirty="0">
-                          <a:solidFill>
-                            <a:sysClr val="windowText" lastClr="000000"/>
-                          </a:solidFill>
-                          <a:effectLst/>
-                          <a:latin typeface="+mn-lt"/>
-                          <a:ea typeface="Times New Roman" panose="02020603050405020304" pitchFamily="18" charset="0"/>
-                          <a:cs typeface="Times New Roman" panose="02020603050405020304" pitchFamily="18" charset="0"/>
-                        </a:rPr>
-                        <a:t>Dia</a:t>
-                      </a:r>
-                    </a:p>
-                  </a:txBody>
-                  <a:tcPr marL="44634" marR="44634" marT="0" marB="0">
-                    <a:lnL w="12700" cap="flat" cmpd="sng" algn="ctr">
-                      <a:solidFill>
-                        <a:schemeClr val="tx1"/>
-                      </a:solidFill>
-                      <a:prstDash val="solid"/>
-                      <a:round/>
-                      <a:headEnd type="none" w="med" len="med"/>
-                      <a:tailEnd type="none" w="med" len="med"/>
-                    </a:lnL>
-                    <a:lnR w="12700" cap="flat" cmpd="sng" algn="ctr">
-                      <a:solidFill>
-                        <a:schemeClr val="tx1"/>
-                      </a:solidFill>
-                      <a:prstDash val="solid"/>
-                      <a:round/>
-                      <a:headEnd type="none" w="med" len="med"/>
-                      <a:tailEnd type="none" w="med" len="med"/>
-                    </a:lnR>
-                    <a:lnT w="12700" cap="flat" cmpd="sng" algn="ctr">
-                      <a:solidFill>
-                        <a:schemeClr val="tx1"/>
-                      </a:solidFill>
-                      <a:prstDash val="solid"/>
-                      <a:round/>
-                      <a:headEnd type="none" w="med" len="med"/>
-                      <a:tailEnd type="none" w="med" len="med"/>
-                    </a:lnT>
-                    <a:lnB w="12700" cap="flat" cmpd="sng" algn="ctr">
-                      <a:solidFill>
-                        <a:schemeClr val="tx1"/>
-                      </a:solidFill>
-                      <a:prstDash val="solid"/>
-                      <a:round/>
-                      <a:headEnd type="none" w="med" len="med"/>
-                      <a:tailEnd type="none" w="med" len="med"/>
-                    </a:lnB>
-                  </a:tcPr>
+                  <a:tcPr marL="68580" marR="68580" marT="0" marB="0"/>
                 </a:tc>
                 <a:tc>
                   <a:txBody>
@@ -10866,26 +10286,17 @@
                         </a:spcAft>
                       </a:pPr>
                       <a:r>
-                        <a:rPr lang="pt-BR" sz="1200" dirty="0">
+                        <a:rPr lang="en-US" sz="1200">
                           <a:solidFill>
-                            <a:sysClr val="windowText" lastClr="000000"/>
+                            <a:schemeClr val="tx1"/>
                           </a:solidFill>
                           <a:effectLst/>
                         </a:rPr>
-                        <a:t>Tipo de Ataque </a:t>
+                        <a:t>-</a:t>
                       </a:r>
-                      <a:r>
-                        <a:rPr lang="pt-BR" sz="1200" dirty="0" err="1">
-                          <a:solidFill>
-                            <a:sysClr val="windowText" lastClr="000000"/>
-                          </a:solidFill>
-                          <a:effectLst/>
-                        </a:rPr>
-                        <a:t>DDoS</a:t>
-                      </a:r>
-                      <a:endParaRPr lang="pt-BR" sz="1200" dirty="0">
+                      <a:endParaRPr lang="pt-BR" sz="1200">
                         <a:solidFill>
-                          <a:sysClr val="windowText" lastClr="000000"/>
+                          <a:schemeClr val="tx1"/>
                         </a:solidFill>
                         <a:effectLst/>
                         <a:latin typeface="Times New Roman" panose="02020603050405020304" pitchFamily="18" charset="0"/>
@@ -10894,124 +10305,15 @@
                       </a:endParaRPr>
                     </a:p>
                   </a:txBody>
-                  <a:tcPr marL="44634" marR="44634" marT="0" marB="0">
-                    <a:lnL w="12700" cap="flat" cmpd="sng" algn="ctr">
-                      <a:solidFill>
-                        <a:schemeClr val="tx1"/>
-                      </a:solidFill>
-                      <a:prstDash val="solid"/>
-                      <a:round/>
-                      <a:headEnd type="none" w="med" len="med"/>
-                      <a:tailEnd type="none" w="med" len="med"/>
-                    </a:lnL>
-                    <a:lnR w="12700" cap="flat" cmpd="sng" algn="ctr">
-                      <a:solidFill>
-                        <a:schemeClr val="tx1"/>
-                      </a:solidFill>
-                      <a:prstDash val="solid"/>
-                      <a:round/>
-                      <a:headEnd type="none" w="med" len="med"/>
-                      <a:tailEnd type="none" w="med" len="med"/>
-                    </a:lnR>
-                    <a:lnT w="12700" cap="flat" cmpd="sng" algn="ctr">
-                      <a:solidFill>
-                        <a:schemeClr val="tx1"/>
-                      </a:solidFill>
-                      <a:prstDash val="solid"/>
-                      <a:round/>
-                      <a:headEnd type="none" w="med" len="med"/>
-                      <a:tailEnd type="none" w="med" len="med"/>
-                    </a:lnT>
-                    <a:lnB w="12700" cap="flat" cmpd="sng" algn="ctr">
-                      <a:solidFill>
-                        <a:schemeClr val="tx1"/>
-                      </a:solidFill>
-                      <a:prstDash val="solid"/>
-                      <a:round/>
-                      <a:headEnd type="none" w="med" len="med"/>
-                      <a:tailEnd type="none" w="med" len="med"/>
-                    </a:lnB>
-                  </a:tcPr>
-                </a:tc>
-                <a:tc>
-                  <a:txBody>
-                    <a:bodyPr/>
-                    <a:lstStyle/>
-                    <a:p>
-                      <a:pPr algn="ctr">
-                        <a:lnSpc>
-                          <a:spcPct val="150000"/>
-                        </a:lnSpc>
-                        <a:spcAft>
-                          <a:spcPts val="800"/>
-                        </a:spcAft>
-                      </a:pPr>
-                      <a:r>
-                        <a:rPr lang="pt-BR" sz="1200" dirty="0">
-                          <a:solidFill>
-                            <a:sysClr val="windowText" lastClr="000000"/>
-                          </a:solidFill>
-                          <a:effectLst/>
-                        </a:rPr>
-                        <a:t>Horário dos ataques</a:t>
-                      </a:r>
-                      <a:endParaRPr lang="pt-BR" sz="1200" dirty="0">
-                        <a:solidFill>
-                          <a:sysClr val="windowText" lastClr="000000"/>
-                        </a:solidFill>
-                        <a:effectLst/>
-                        <a:latin typeface="Times New Roman" panose="02020603050405020304" pitchFamily="18" charset="0"/>
-                        <a:ea typeface="Times New Roman" panose="02020603050405020304" pitchFamily="18" charset="0"/>
-                        <a:cs typeface="Times New Roman" panose="02020603050405020304" pitchFamily="18" charset="0"/>
-                      </a:endParaRPr>
-                    </a:p>
-                  </a:txBody>
-                  <a:tcPr marL="44634" marR="44634" marT="0" marB="0">
-                    <a:lnL w="12700" cap="flat" cmpd="sng" algn="ctr">
-                      <a:solidFill>
-                        <a:schemeClr val="tx1"/>
-                      </a:solidFill>
-                      <a:prstDash val="solid"/>
-                      <a:round/>
-                      <a:headEnd type="none" w="med" len="med"/>
-                      <a:tailEnd type="none" w="med" len="med"/>
-                    </a:lnL>
-                    <a:lnR w="12700" cap="flat" cmpd="sng" algn="ctr">
-                      <a:solidFill>
-                        <a:schemeClr val="tx1"/>
-                      </a:solidFill>
-                      <a:prstDash val="solid"/>
-                      <a:round/>
-                      <a:headEnd type="none" w="med" len="med"/>
-                      <a:tailEnd type="none" w="med" len="med"/>
-                    </a:lnR>
-                    <a:lnT w="12700" cap="flat" cmpd="sng" algn="ctr">
-                      <a:solidFill>
-                        <a:schemeClr val="tx1"/>
-                      </a:solidFill>
-                      <a:prstDash val="solid"/>
-                      <a:round/>
-                      <a:headEnd type="none" w="med" len="med"/>
-                      <a:tailEnd type="none" w="med" len="med"/>
-                    </a:lnT>
-                    <a:lnB w="12700" cap="flat" cmpd="sng" algn="ctr">
-                      <a:solidFill>
-                        <a:schemeClr val="tx1"/>
-                      </a:solidFill>
-                      <a:prstDash val="solid"/>
-                      <a:round/>
-                      <a:headEnd type="none" w="med" len="med"/>
-                      <a:tailEnd type="none" w="med" len="med"/>
-                    </a:lnB>
-                  </a:tcPr>
+                  <a:tcPr marL="68580" marR="68580" marT="0" marB="0"/>
                 </a:tc>
                 <a:extLst>
                   <a:ext uri="{0D108BD9-81ED-4DB2-BD59-A6C34878D82A}">
-                    <a16:rowId xmlns:a16="http://schemas.microsoft.com/office/drawing/2014/main" val="1130631547"/>
+                    <a16:rowId xmlns:a16="http://schemas.microsoft.com/office/drawing/2014/main" val="2259523293"/>
                   </a:ext>
                 </a:extLst>
               </a:tr>
-              <a:tr h="2726698">
+              <a:tr h="0">
                 <a:tc>
                   <a:txBody>
                     <a:bodyPr/>
@@ -11028,15 +10330,15 @@
                       <a:r>
                         <a:rPr lang="en-US" sz="1200" dirty="0">
                           <a:solidFill>
-                            <a:sysClr val="windowText" lastClr="000000"/>
+                            <a:schemeClr val="tx1"/>
                           </a:solidFill>
                           <a:effectLst/>
                         </a:rPr>
-                        <a:t>2</a:t>
+                        <a:t>DDoS LOIT</a:t>
                       </a:r>
                       <a:endParaRPr lang="pt-BR" sz="1200" dirty="0">
                         <a:solidFill>
-                          <a:sysClr val="windowText" lastClr="000000"/>
+                          <a:schemeClr val="tx1"/>
                         </a:solidFill>
                         <a:effectLst/>
                         <a:latin typeface="Times New Roman" panose="02020603050405020304" pitchFamily="18" charset="0"/>
@@ -11045,324 +10347,12 @@
                       </a:endParaRPr>
                     </a:p>
                   </a:txBody>
-                  <a:tcPr marL="44634" marR="44634" marT="0" marB="0">
-                    <a:lnL w="12700" cap="flat" cmpd="sng" algn="ctr">
-                      <a:solidFill>
-                        <a:schemeClr val="tx1"/>
-                      </a:solidFill>
-                      <a:prstDash val="solid"/>
-                      <a:round/>
-                      <a:headEnd type="none" w="med" len="med"/>
-                      <a:tailEnd type="none" w="med" len="med"/>
-                    </a:lnL>
-                    <a:lnR w="12700" cap="flat" cmpd="sng" algn="ctr">
-                      <a:solidFill>
-                        <a:schemeClr val="tx1"/>
-                      </a:solidFill>
-                      <a:prstDash val="solid"/>
-                      <a:round/>
-                      <a:headEnd type="none" w="med" len="med"/>
-                      <a:tailEnd type="none" w="med" len="med"/>
-                    </a:lnR>
-                    <a:lnT w="12700" cap="flat" cmpd="sng" algn="ctr">
-                      <a:solidFill>
-                        <a:schemeClr val="tx1"/>
-                      </a:solidFill>
-                      <a:prstDash val="solid"/>
-                      <a:round/>
-                      <a:headEnd type="none" w="med" len="med"/>
-                      <a:tailEnd type="none" w="med" len="med"/>
-                    </a:lnT>
-                    <a:lnB w="12700" cap="flat" cmpd="sng" algn="ctr">
-                      <a:solidFill>
-                        <a:schemeClr val="tx1"/>
-                      </a:solidFill>
-                      <a:prstDash val="solid"/>
-                      <a:round/>
-                      <a:headEnd type="none" w="med" len="med"/>
-                      <a:tailEnd type="none" w="med" len="med"/>
-                    </a:lnB>
-                  </a:tcPr>
+                  <a:tcPr marL="68580" marR="68580" marT="0" marB="0"/>
                 </a:tc>
                 <a:tc>
                   <a:txBody>
                     <a:bodyPr/>
                     <a:lstStyle/>
-                    <a:p>
-                      <a:pPr algn="ctr">
-                        <a:lnSpc>
-                          <a:spcPct val="107000"/>
-                        </a:lnSpc>
-                        <a:spcAft>
-                          <a:spcPts val="800"/>
-                        </a:spcAft>
-                      </a:pPr>
-                      <a:r>
-                        <a:rPr lang="en-US" sz="1200" dirty="0">
-                          <a:solidFill>
-                            <a:sysClr val="windowText" lastClr="000000"/>
-                          </a:solidFill>
-                          <a:effectLst/>
-                        </a:rPr>
-                        <a:t>NTP</a:t>
-                      </a:r>
-                      <a:endParaRPr lang="pt-BR" sz="1200" dirty="0">
-                        <a:solidFill>
-                          <a:sysClr val="windowText" lastClr="000000"/>
-                        </a:solidFill>
-                        <a:effectLst/>
-                      </a:endParaRPr>
-                    </a:p>
-                    <a:p>
-                      <a:pPr algn="ctr">
-                        <a:lnSpc>
-                          <a:spcPct val="107000"/>
-                        </a:lnSpc>
-                        <a:spcAft>
-                          <a:spcPts val="800"/>
-                        </a:spcAft>
-                      </a:pPr>
-                      <a:r>
-                        <a:rPr lang="en-US" sz="1200" dirty="0">
-                          <a:solidFill>
-                            <a:sysClr val="windowText" lastClr="000000"/>
-                          </a:solidFill>
-                          <a:effectLst/>
-                        </a:rPr>
-                        <a:t>DNS</a:t>
-                      </a:r>
-                      <a:endParaRPr lang="pt-BR" sz="1200" dirty="0">
-                        <a:solidFill>
-                          <a:sysClr val="windowText" lastClr="000000"/>
-                        </a:solidFill>
-                        <a:effectLst/>
-                      </a:endParaRPr>
-                    </a:p>
-                    <a:p>
-                      <a:pPr algn="ctr">
-                        <a:lnSpc>
-                          <a:spcPct val="107000"/>
-                        </a:lnSpc>
-                        <a:spcAft>
-                          <a:spcPts val="800"/>
-                        </a:spcAft>
-                      </a:pPr>
-                      <a:r>
-                        <a:rPr lang="en-US" sz="1200" dirty="0">
-                          <a:solidFill>
-                            <a:sysClr val="windowText" lastClr="000000"/>
-                          </a:solidFill>
-                          <a:effectLst/>
-                        </a:rPr>
-                        <a:t>LDAP</a:t>
-                      </a:r>
-                      <a:endParaRPr lang="pt-BR" sz="1200" dirty="0">
-                        <a:solidFill>
-                          <a:sysClr val="windowText" lastClr="000000"/>
-                        </a:solidFill>
-                        <a:effectLst/>
-                      </a:endParaRPr>
-                    </a:p>
-                    <a:p>
-                      <a:pPr algn="ctr">
-                        <a:lnSpc>
-                          <a:spcPct val="107000"/>
-                        </a:lnSpc>
-                        <a:spcAft>
-                          <a:spcPts val="800"/>
-                        </a:spcAft>
-                      </a:pPr>
-                      <a:r>
-                        <a:rPr lang="en-US" sz="1200" dirty="0">
-                          <a:solidFill>
-                            <a:sysClr val="windowText" lastClr="000000"/>
-                          </a:solidFill>
-                          <a:effectLst/>
-                        </a:rPr>
-                        <a:t>MSSQL</a:t>
-                      </a:r>
-                      <a:endParaRPr lang="pt-BR" sz="1200" dirty="0">
-                        <a:solidFill>
-                          <a:sysClr val="windowText" lastClr="000000"/>
-                        </a:solidFill>
-                        <a:effectLst/>
-                      </a:endParaRPr>
-                    </a:p>
-                    <a:p>
-                      <a:pPr algn="ctr">
-                        <a:lnSpc>
-                          <a:spcPct val="107000"/>
-                        </a:lnSpc>
-                        <a:spcAft>
-                          <a:spcPts val="800"/>
-                        </a:spcAft>
-                      </a:pPr>
-                      <a:r>
-                        <a:rPr lang="en-US" sz="1200" dirty="0">
-                          <a:solidFill>
-                            <a:sysClr val="windowText" lastClr="000000"/>
-                          </a:solidFill>
-                          <a:effectLst/>
-                        </a:rPr>
-                        <a:t>NetBIOS</a:t>
-                      </a:r>
-                      <a:endParaRPr lang="pt-BR" sz="1200" dirty="0">
-                        <a:solidFill>
-                          <a:sysClr val="windowText" lastClr="000000"/>
-                        </a:solidFill>
-                        <a:effectLst/>
-                      </a:endParaRPr>
-                    </a:p>
-                    <a:p>
-                      <a:pPr algn="ctr">
-                        <a:lnSpc>
-                          <a:spcPct val="107000"/>
-                        </a:lnSpc>
-                        <a:spcAft>
-                          <a:spcPts val="800"/>
-                        </a:spcAft>
-                      </a:pPr>
-                      <a:r>
-                        <a:rPr lang="en-US" sz="1200" dirty="0">
-                          <a:solidFill>
-                            <a:sysClr val="windowText" lastClr="000000"/>
-                          </a:solidFill>
-                          <a:effectLst/>
-                        </a:rPr>
-                        <a:t>SNMP</a:t>
-                      </a:r>
-                      <a:endParaRPr lang="pt-BR" sz="1200" dirty="0">
-                        <a:solidFill>
-                          <a:sysClr val="windowText" lastClr="000000"/>
-                        </a:solidFill>
-                        <a:effectLst/>
-                      </a:endParaRPr>
-                    </a:p>
-                    <a:p>
-                      <a:pPr algn="ctr">
-                        <a:lnSpc>
-                          <a:spcPct val="107000"/>
-                        </a:lnSpc>
-                        <a:spcAft>
-                          <a:spcPts val="800"/>
-                        </a:spcAft>
-                      </a:pPr>
-                      <a:r>
-                        <a:rPr lang="en-US" sz="1200" dirty="0">
-                          <a:solidFill>
-                            <a:sysClr val="windowText" lastClr="000000"/>
-                          </a:solidFill>
-                          <a:effectLst/>
-                        </a:rPr>
-                        <a:t>SSDP</a:t>
-                      </a:r>
-                      <a:endParaRPr lang="pt-BR" sz="1200" dirty="0">
-                        <a:solidFill>
-                          <a:sysClr val="windowText" lastClr="000000"/>
-                        </a:solidFill>
-                        <a:effectLst/>
-                      </a:endParaRPr>
-                    </a:p>
-                    <a:p>
-                      <a:pPr algn="ctr">
-                        <a:lnSpc>
-                          <a:spcPct val="107000"/>
-                        </a:lnSpc>
-                        <a:spcAft>
-                          <a:spcPts val="800"/>
-                        </a:spcAft>
-                      </a:pPr>
-                      <a:r>
-                        <a:rPr lang="en-US" sz="1200" dirty="0">
-                          <a:solidFill>
-                            <a:sysClr val="windowText" lastClr="000000"/>
-                          </a:solidFill>
-                          <a:effectLst/>
-                        </a:rPr>
-                        <a:t>UDP</a:t>
-                      </a:r>
-                      <a:endParaRPr lang="pt-BR" sz="1200" dirty="0">
-                        <a:solidFill>
-                          <a:sysClr val="windowText" lastClr="000000"/>
-                        </a:solidFill>
-                        <a:effectLst/>
-                      </a:endParaRPr>
-                    </a:p>
-                    <a:p>
-                      <a:pPr algn="ctr">
-                        <a:lnSpc>
-                          <a:spcPct val="107000"/>
-                        </a:lnSpc>
-                        <a:spcAft>
-                          <a:spcPts val="800"/>
-                        </a:spcAft>
-                      </a:pPr>
-                      <a:r>
-                        <a:rPr lang="en-US" sz="1200" dirty="0">
-                          <a:solidFill>
-                            <a:sysClr val="windowText" lastClr="000000"/>
-                          </a:solidFill>
-                          <a:effectLst/>
-                        </a:rPr>
-                        <a:t>UDP-Lag</a:t>
-                      </a:r>
-                      <a:endParaRPr lang="pt-BR" sz="1200" dirty="0">
-                        <a:solidFill>
-                          <a:sysClr val="windowText" lastClr="000000"/>
-                        </a:solidFill>
-                        <a:effectLst/>
-                      </a:endParaRPr>
-                    </a:p>
-                    <a:p>
-                      <a:pPr algn="ctr">
-                        <a:lnSpc>
-                          <a:spcPct val="107000"/>
-                        </a:lnSpc>
-                        <a:spcAft>
-                          <a:spcPts val="800"/>
-                        </a:spcAft>
-                      </a:pPr>
-                      <a:r>
-                        <a:rPr lang="en-US" sz="1200" dirty="0" err="1">
-                          <a:solidFill>
-                            <a:sysClr val="windowText" lastClr="000000"/>
-                          </a:solidFill>
-                          <a:effectLst/>
-                        </a:rPr>
-                        <a:t>WebDDoS</a:t>
-                      </a:r>
-                      <a:endParaRPr lang="pt-BR" sz="1200" dirty="0">
-                        <a:solidFill>
-                          <a:sysClr val="windowText" lastClr="000000"/>
-                        </a:solidFill>
-                        <a:effectLst/>
-                      </a:endParaRPr>
-                    </a:p>
-                    <a:p>
-                      <a:pPr algn="ctr">
-                        <a:lnSpc>
-                          <a:spcPct val="107000"/>
-                        </a:lnSpc>
-                        <a:spcAft>
-                          <a:spcPts val="800"/>
-                        </a:spcAft>
-                      </a:pPr>
-                      <a:r>
-                        <a:rPr lang="en-US" sz="1200" dirty="0">
-                          <a:solidFill>
-                            <a:sysClr val="windowText" lastClr="000000"/>
-                          </a:solidFill>
-                          <a:effectLst/>
-                        </a:rPr>
-                        <a:t>SYN</a:t>
-                      </a:r>
-                      <a:endParaRPr lang="pt-BR" sz="1200" dirty="0">
-                        <a:solidFill>
-                          <a:sysClr val="windowText" lastClr="000000"/>
-                        </a:solidFill>
-                        <a:effectLst/>
-                      </a:endParaRPr>
-                    </a:p>
                     <a:p>
                       <a:pPr algn="ctr">
                         <a:lnSpc>
@@ -11375,15 +10365,15 @@
                       <a:r>
                         <a:rPr lang="en-US" sz="1200" dirty="0">
                           <a:solidFill>
-                            <a:sysClr val="windowText" lastClr="000000"/>
+                            <a:schemeClr val="tx1"/>
                           </a:solidFill>
                           <a:effectLst/>
                         </a:rPr>
-                        <a:t>TFTP</a:t>
+                        <a:t>15:56 - 16:16</a:t>
                       </a:r>
                       <a:endParaRPr lang="pt-BR" sz="1200" dirty="0">
                         <a:solidFill>
-                          <a:sysClr val="windowText" lastClr="000000"/>
+                          <a:schemeClr val="tx1"/>
                         </a:solidFill>
                         <a:effectLst/>
                         <a:latin typeface="Times New Roman" panose="02020603050405020304" pitchFamily="18" charset="0"/>
@@ -11392,395 +10382,11 @@
                       </a:endParaRPr>
                     </a:p>
                   </a:txBody>
-                  <a:tcPr marL="44634" marR="44634" marT="0" marB="0">
-                    <a:lnL w="12700" cap="flat" cmpd="sng" algn="ctr">
-                      <a:solidFill>
-                        <a:schemeClr val="tx1"/>
-                      </a:solidFill>
-                      <a:prstDash val="solid"/>
-                      <a:round/>
-                      <a:headEnd type="none" w="med" len="med"/>
-                      <a:tailEnd type="none" w="med" len="med"/>
-                    </a:lnL>
-                    <a:lnR w="12700" cap="flat" cmpd="sng" algn="ctr">
-                      <a:solidFill>
-                        <a:schemeClr val="tx1"/>
-                      </a:solidFill>
-                      <a:prstDash val="solid"/>
-                      <a:round/>
-                      <a:headEnd type="none" w="med" len="med"/>
-                      <a:tailEnd type="none" w="med" len="med"/>
-                    </a:lnR>
-                    <a:lnT w="12700" cap="flat" cmpd="sng" algn="ctr">
-                      <a:solidFill>
-                        <a:schemeClr val="tx1"/>
-                      </a:solidFill>
-                      <a:prstDash val="solid"/>
-                      <a:round/>
-                      <a:headEnd type="none" w="med" len="med"/>
-                      <a:tailEnd type="none" w="med" len="med"/>
-                    </a:lnT>
-                    <a:lnB w="12700" cap="flat" cmpd="sng" algn="ctr">
-                      <a:solidFill>
-                        <a:schemeClr val="tx1"/>
-                      </a:solidFill>
-                      <a:prstDash val="solid"/>
-                      <a:round/>
-                      <a:headEnd type="none" w="med" len="med"/>
-                      <a:tailEnd type="none" w="med" len="med"/>
-                    </a:lnB>
-                  </a:tcPr>
-                </a:tc>
-                <a:tc>
-                  <a:txBody>
-                    <a:bodyPr/>
-                    <a:lstStyle/>
-                    <a:p>
-                      <a:pPr algn="ctr">
-                        <a:lnSpc>
-                          <a:spcPct val="107000"/>
-                        </a:lnSpc>
-                        <a:spcAft>
-                          <a:spcPts val="800"/>
-                        </a:spcAft>
-                      </a:pPr>
-                      <a:r>
-                        <a:rPr lang="en-US" sz="1200" dirty="0">
-                          <a:solidFill>
-                            <a:sysClr val="windowText" lastClr="000000"/>
-                          </a:solidFill>
-                          <a:effectLst/>
-                        </a:rPr>
-                        <a:t>10:35 - 10:45</a:t>
-                      </a:r>
-                      <a:endParaRPr lang="pt-BR" sz="1200" dirty="0">
-                        <a:solidFill>
-                          <a:sysClr val="windowText" lastClr="000000"/>
-                        </a:solidFill>
-                        <a:effectLst/>
-                      </a:endParaRPr>
-                    </a:p>
-                    <a:p>
-                      <a:pPr algn="ctr">
-                        <a:lnSpc>
-                          <a:spcPct val="107000"/>
-                        </a:lnSpc>
-                        <a:spcAft>
-                          <a:spcPts val="800"/>
-                        </a:spcAft>
-                      </a:pPr>
-                      <a:r>
-                        <a:rPr lang="en-US" sz="1200" dirty="0">
-                          <a:solidFill>
-                            <a:sysClr val="windowText" lastClr="000000"/>
-                          </a:solidFill>
-                          <a:effectLst/>
-                        </a:rPr>
-                        <a:t>10:52 - 11:05</a:t>
-                      </a:r>
-                      <a:endParaRPr lang="pt-BR" sz="1200" dirty="0">
-                        <a:solidFill>
-                          <a:sysClr val="windowText" lastClr="000000"/>
-                        </a:solidFill>
-                        <a:effectLst/>
-                      </a:endParaRPr>
-                    </a:p>
-                    <a:p>
-                      <a:pPr algn="ctr">
-                        <a:lnSpc>
-                          <a:spcPct val="107000"/>
-                        </a:lnSpc>
-                        <a:spcAft>
-                          <a:spcPts val="800"/>
-                        </a:spcAft>
-                      </a:pPr>
-                      <a:r>
-                        <a:rPr lang="en-US" sz="1200" dirty="0">
-                          <a:solidFill>
-                            <a:sysClr val="windowText" lastClr="000000"/>
-                          </a:solidFill>
-                          <a:effectLst/>
-                        </a:rPr>
-                        <a:t>11:22 - 11:32</a:t>
-                      </a:r>
-                      <a:endParaRPr lang="pt-BR" sz="1200" dirty="0">
-                        <a:solidFill>
-                          <a:sysClr val="windowText" lastClr="000000"/>
-                        </a:solidFill>
-                        <a:effectLst/>
-                      </a:endParaRPr>
-                    </a:p>
-                    <a:p>
-                      <a:pPr algn="ctr">
-                        <a:lnSpc>
-                          <a:spcPct val="107000"/>
-                        </a:lnSpc>
-                        <a:spcAft>
-                          <a:spcPts val="800"/>
-                        </a:spcAft>
-                      </a:pPr>
-                      <a:r>
-                        <a:rPr lang="en-US" sz="1200" dirty="0">
-                          <a:solidFill>
-                            <a:sysClr val="windowText" lastClr="000000"/>
-                          </a:solidFill>
-                          <a:effectLst/>
-                        </a:rPr>
-                        <a:t>11:36 - 11:45</a:t>
-                      </a:r>
-                      <a:endParaRPr lang="pt-BR" sz="1200" dirty="0">
-                        <a:solidFill>
-                          <a:sysClr val="windowText" lastClr="000000"/>
-                        </a:solidFill>
-                        <a:effectLst/>
-                      </a:endParaRPr>
-                    </a:p>
-                    <a:p>
-                      <a:pPr algn="ctr">
-                        <a:lnSpc>
-                          <a:spcPct val="107000"/>
-                        </a:lnSpc>
-                        <a:spcAft>
-                          <a:spcPts val="800"/>
-                        </a:spcAft>
-                      </a:pPr>
-                      <a:r>
-                        <a:rPr lang="en-US" sz="1200" dirty="0">
-                          <a:solidFill>
-                            <a:sysClr val="windowText" lastClr="000000"/>
-                          </a:solidFill>
-                          <a:effectLst/>
-                        </a:rPr>
-                        <a:t>11:50 - 12:00</a:t>
-                      </a:r>
-                      <a:endParaRPr lang="pt-BR" sz="1200" dirty="0">
-                        <a:solidFill>
-                          <a:sysClr val="windowText" lastClr="000000"/>
-                        </a:solidFill>
-                        <a:effectLst/>
-                      </a:endParaRPr>
-                    </a:p>
-                    <a:p>
-                      <a:pPr algn="ctr">
-                        <a:lnSpc>
-                          <a:spcPct val="107000"/>
-                        </a:lnSpc>
-                        <a:spcAft>
-                          <a:spcPts val="800"/>
-                        </a:spcAft>
-                      </a:pPr>
-                      <a:r>
-                        <a:rPr lang="en-US" sz="1200" dirty="0">
-                          <a:solidFill>
-                            <a:sysClr val="windowText" lastClr="000000"/>
-                          </a:solidFill>
-                          <a:effectLst/>
-                        </a:rPr>
-                        <a:t>12:12 - 12:23</a:t>
-                      </a:r>
-                      <a:endParaRPr lang="pt-BR" sz="1200" dirty="0">
-                        <a:solidFill>
-                          <a:sysClr val="windowText" lastClr="000000"/>
-                        </a:solidFill>
-                        <a:effectLst/>
-                      </a:endParaRPr>
-                    </a:p>
-                    <a:p>
-                      <a:pPr algn="ctr">
-                        <a:lnSpc>
-                          <a:spcPct val="107000"/>
-                        </a:lnSpc>
-                        <a:spcAft>
-                          <a:spcPts val="800"/>
-                        </a:spcAft>
-                      </a:pPr>
-                      <a:r>
-                        <a:rPr lang="en-US" sz="1200" dirty="0">
-                          <a:solidFill>
-                            <a:sysClr val="windowText" lastClr="000000"/>
-                          </a:solidFill>
-                          <a:effectLst/>
-                        </a:rPr>
-                        <a:t>12:27 - 12:37</a:t>
-                      </a:r>
-                      <a:endParaRPr lang="pt-BR" sz="1200" dirty="0">
-                        <a:solidFill>
-                          <a:sysClr val="windowText" lastClr="000000"/>
-                        </a:solidFill>
-                        <a:effectLst/>
-                      </a:endParaRPr>
-                    </a:p>
-                    <a:p>
-                      <a:pPr algn="ctr">
-                        <a:lnSpc>
-                          <a:spcPct val="107000"/>
-                        </a:lnSpc>
-                        <a:spcAft>
-                          <a:spcPts val="800"/>
-                        </a:spcAft>
-                      </a:pPr>
-                      <a:r>
-                        <a:rPr lang="en-US" sz="1200" dirty="0">
-                          <a:solidFill>
-                            <a:sysClr val="windowText" lastClr="000000"/>
-                          </a:solidFill>
-                          <a:effectLst/>
-                        </a:rPr>
-                        <a:t>12:45 - 13:09</a:t>
-                      </a:r>
-                      <a:endParaRPr lang="pt-BR" sz="1200" dirty="0">
-                        <a:solidFill>
-                          <a:sysClr val="windowText" lastClr="000000"/>
-                        </a:solidFill>
-                        <a:effectLst/>
-                      </a:endParaRPr>
-                    </a:p>
-                    <a:p>
-                      <a:pPr algn="ctr">
-                        <a:lnSpc>
-                          <a:spcPct val="107000"/>
-                        </a:lnSpc>
-                        <a:spcAft>
-                          <a:spcPts val="800"/>
-                        </a:spcAft>
-                      </a:pPr>
-                      <a:r>
-                        <a:rPr lang="en-US" sz="1200" dirty="0">
-                          <a:solidFill>
-                            <a:sysClr val="windowText" lastClr="000000"/>
-                          </a:solidFill>
-                          <a:effectLst/>
-                        </a:rPr>
-                        <a:t>13:11 - 13:15</a:t>
-                      </a:r>
-                      <a:endParaRPr lang="pt-BR" sz="1200" dirty="0">
-                        <a:solidFill>
-                          <a:sysClr val="windowText" lastClr="000000"/>
-                        </a:solidFill>
-                        <a:effectLst/>
-                      </a:endParaRPr>
-                    </a:p>
-                    <a:p>
-                      <a:pPr algn="ctr">
-                        <a:lnSpc>
-                          <a:spcPct val="107000"/>
-                        </a:lnSpc>
-                        <a:spcAft>
-                          <a:spcPts val="800"/>
-                        </a:spcAft>
-                      </a:pPr>
-                      <a:r>
-                        <a:rPr lang="en-US" sz="1200" dirty="0">
-                          <a:solidFill>
-                            <a:sysClr val="windowText" lastClr="000000"/>
-                          </a:solidFill>
-                          <a:effectLst/>
-                        </a:rPr>
-                        <a:t>13:18 - 13:29</a:t>
-                      </a:r>
-                      <a:endParaRPr lang="pt-BR" sz="1200" dirty="0">
-                        <a:solidFill>
-                          <a:sysClr val="windowText" lastClr="000000"/>
-                        </a:solidFill>
-                        <a:effectLst/>
-                      </a:endParaRPr>
-                    </a:p>
-                    <a:p>
-                      <a:pPr algn="ctr">
-                        <a:lnSpc>
-                          <a:spcPct val="107000"/>
-                        </a:lnSpc>
-                        <a:spcAft>
-                          <a:spcPts val="800"/>
-                        </a:spcAft>
-                      </a:pPr>
-                      <a:r>
-                        <a:rPr lang="en-US" sz="1200" dirty="0">
-                          <a:solidFill>
-                            <a:sysClr val="windowText" lastClr="000000"/>
-                          </a:solidFill>
-                          <a:effectLst/>
-                        </a:rPr>
-                        <a:t>13:29 - 13:34</a:t>
-                      </a:r>
-                      <a:endParaRPr lang="pt-BR" sz="1200" dirty="0">
-                        <a:solidFill>
-                          <a:sysClr val="windowText" lastClr="000000"/>
-                        </a:solidFill>
-                        <a:effectLst/>
-                      </a:endParaRPr>
-                    </a:p>
-                    <a:p>
-                      <a:pPr algn="ctr">
-                        <a:lnSpc>
-                          <a:spcPct val="150000"/>
-                        </a:lnSpc>
-                        <a:spcAft>
-                          <a:spcPts val="800"/>
-                        </a:spcAft>
-                      </a:pPr>
-                      <a:r>
-                        <a:rPr lang="en-US" sz="1200" dirty="0">
-                          <a:solidFill>
-                            <a:sysClr val="windowText" lastClr="000000"/>
-                          </a:solidFill>
-                          <a:effectLst/>
-                        </a:rPr>
-                        <a:t>13:35 - 17:15</a:t>
-                      </a:r>
-                      <a:endParaRPr lang="pt-BR" sz="1200" dirty="0">
-                        <a:solidFill>
-                          <a:sysClr val="windowText" lastClr="000000"/>
-                        </a:solidFill>
-                        <a:effectLst/>
-                        <a:latin typeface="Times New Roman" panose="02020603050405020304" pitchFamily="18" charset="0"/>
-                        <a:ea typeface="Times New Roman" panose="02020603050405020304" pitchFamily="18" charset="0"/>
-                        <a:cs typeface="Times New Roman" panose="02020603050405020304" pitchFamily="18" charset="0"/>
-                      </a:endParaRPr>
-                    </a:p>
-                  </a:txBody>
-                  <a:tcPr marL="44634" marR="44634" marT="0" marB="0">
-                    <a:lnL w="12700" cap="flat" cmpd="sng" algn="ctr">
-                      <a:solidFill>
-                        <a:schemeClr val="tx1"/>
-                      </a:solidFill>
-                      <a:prstDash val="solid"/>
-                      <a:round/>
-                      <a:headEnd type="none" w="med" len="med"/>
-                      <a:tailEnd type="none" w="med" len="med"/>
-                    </a:lnL>
-                    <a:lnR w="12700" cap="flat" cmpd="sng" algn="ctr">
-                      <a:solidFill>
-                        <a:schemeClr val="tx1"/>
-                      </a:solidFill>
-                      <a:prstDash val="solid"/>
-                      <a:round/>
-                      <a:headEnd type="none" w="med" len="med"/>
-                      <a:tailEnd type="none" w="med" len="med"/>
-                    </a:lnR>
-                    <a:lnT w="12700" cap="flat" cmpd="sng" algn="ctr">
-                      <a:solidFill>
-                        <a:schemeClr val="tx1"/>
-                      </a:solidFill>
-                      <a:prstDash val="solid"/>
-                      <a:round/>
-                      <a:headEnd type="none" w="med" len="med"/>
-                      <a:tailEnd type="none" w="med" len="med"/>
-                    </a:lnT>
-                    <a:lnB w="12700" cap="flat" cmpd="sng" algn="ctr">
-                      <a:solidFill>
-                        <a:schemeClr val="tx1"/>
-                      </a:solidFill>
-                      <a:prstDash val="solid"/>
-                      <a:round/>
-                      <a:headEnd type="none" w="med" len="med"/>
-                      <a:tailEnd type="none" w="med" len="med"/>
-                    </a:lnB>
-                  </a:tcPr>
+                  <a:tcPr marL="68580" marR="68580" marT="0" marB="0"/>
                 </a:tc>
                 <a:extLst>
                   <a:ext uri="{0D108BD9-81ED-4DB2-BD59-A6C34878D82A}">
-                    <a16:rowId xmlns:a16="http://schemas.microsoft.com/office/drawing/2014/main" val="3755414073"/>
+                    <a16:rowId xmlns:a16="http://schemas.microsoft.com/office/drawing/2014/main" val="4127507012"/>
                   </a:ext>
                 </a:extLst>
               </a:tr>
@@ -11788,148 +10394,6 @@
           </a:graphicData>
         </a:graphic>
       </p:graphicFrame>
-      <p:sp>
-        <p:nvSpPr>
-          <p:cNvPr id="7" name="CaixaDeTexto 6">
-            <a:extLst>
-              <a:ext uri="{FF2B5EF4-FFF2-40B4-BE49-F238E27FC236}">
-                <a16:creationId xmlns:a16="http://schemas.microsoft.com/office/drawing/2014/main" id="{C43AA3BD-5002-4ECF-9DDC-827405807158}"/>
-              </a:ext>
-            </a:extLst>
-          </p:cNvPr>
-          <p:cNvSpPr txBox="1"/>
-          <p:nvPr/>
-        </p:nvSpPr>
-        <p:spPr>
-          <a:xfrm>
-            <a:off x="3526753" y="4969595"/>
-            <a:ext cx="1116011" cy="338554"/>
-          </a:xfrm>
-          <a:prstGeom prst="rect">
-            <a:avLst/>
-          </a:prstGeom>
-          <a:noFill/>
-        </p:spPr>
-        <p:txBody>
-          <a:bodyPr wrap="none" rtlCol="0">
-            <a:spAutoFit/>
-          </a:bodyPr>
-          <a:lstStyle/>
-          <a:p>
-            <a:r>
-              <a:rPr lang="pt-BR" sz="1600" dirty="0"/>
-              <a:t>Fonte: [4]</a:t>
-            </a:r>
-          </a:p>
-        </p:txBody>
-      </p:sp>
-      <p:sp>
-        <p:nvSpPr>
-          <p:cNvPr id="13" name="CaixaDeTexto 12">
-            <a:extLst>
-              <a:ext uri="{FF2B5EF4-FFF2-40B4-BE49-F238E27FC236}">
-                <a16:creationId xmlns:a16="http://schemas.microsoft.com/office/drawing/2014/main" id="{5DE1F9FD-4D74-400A-A2BC-D7BE2D701A95}"/>
-              </a:ext>
-            </a:extLst>
-          </p:cNvPr>
-          <p:cNvSpPr txBox="1"/>
-          <p:nvPr/>
-        </p:nvSpPr>
-        <p:spPr>
-          <a:xfrm>
-            <a:off x="8425790" y="5615971"/>
-            <a:ext cx="1116011" cy="338554"/>
-          </a:xfrm>
-          <a:prstGeom prst="rect">
-            <a:avLst/>
-          </a:prstGeom>
-          <a:noFill/>
-        </p:spPr>
-        <p:txBody>
-          <a:bodyPr wrap="none" rtlCol="0">
-            <a:spAutoFit/>
-          </a:bodyPr>
-          <a:lstStyle/>
-          <a:p>
-            <a:r>
-              <a:rPr lang="pt-BR" sz="1600" dirty="0"/>
-              <a:t>Fonte: [4]</a:t>
-            </a:r>
-          </a:p>
-        </p:txBody>
-      </p:sp>
-      <p:sp>
-        <p:nvSpPr>
-          <p:cNvPr id="14" name="CaixaDeTexto 13">
-            <a:extLst>
-              <a:ext uri="{FF2B5EF4-FFF2-40B4-BE49-F238E27FC236}">
-                <a16:creationId xmlns:a16="http://schemas.microsoft.com/office/drawing/2014/main" id="{D3A35BD0-FB59-46CE-BAE7-F806A1E5DA0F}"/>
-              </a:ext>
-            </a:extLst>
-          </p:cNvPr>
-          <p:cNvSpPr txBox="1"/>
-          <p:nvPr/>
-        </p:nvSpPr>
-        <p:spPr>
-          <a:xfrm>
-            <a:off x="2134006" y="1993958"/>
-            <a:ext cx="3787693" cy="338554"/>
-          </a:xfrm>
-          <a:prstGeom prst="rect">
-            <a:avLst/>
-          </a:prstGeom>
-          <a:noFill/>
-        </p:spPr>
-        <p:txBody>
-          <a:bodyPr wrap="square" rtlCol="0">
-            <a:spAutoFit/>
-          </a:bodyPr>
-          <a:lstStyle/>
-          <a:p>
-            <a:pPr algn="ctr"/>
-            <a:r>
-              <a:rPr lang="pt-BR" sz="1600" dirty="0"/>
-              <a:t>Horários dos ataques dia 1</a:t>
-            </a:r>
-          </a:p>
-        </p:txBody>
-      </p:sp>
-      <p:sp>
-        <p:nvSpPr>
-          <p:cNvPr id="15" name="CaixaDeTexto 14">
-            <a:extLst>
-              <a:ext uri="{FF2B5EF4-FFF2-40B4-BE49-F238E27FC236}">
-                <a16:creationId xmlns:a16="http://schemas.microsoft.com/office/drawing/2014/main" id="{01CE760C-26F1-4E75-BB2A-338C45E0B28B}"/>
-              </a:ext>
-            </a:extLst>
-          </p:cNvPr>
-          <p:cNvSpPr txBox="1"/>
-          <p:nvPr/>
-        </p:nvSpPr>
-        <p:spPr>
-          <a:xfrm>
-            <a:off x="7033041" y="1250691"/>
-            <a:ext cx="3787693" cy="338554"/>
-          </a:xfrm>
-          <a:prstGeom prst="rect">
-            <a:avLst/>
-          </a:prstGeom>
-          <a:noFill/>
-        </p:spPr>
-        <p:txBody>
-          <a:bodyPr wrap="square" rtlCol="0">
-            <a:spAutoFit/>
-          </a:bodyPr>
-          <a:lstStyle/>
-          <a:p>
-            <a:pPr algn="ctr"/>
-            <a:r>
-              <a:rPr lang="pt-BR" sz="1600" dirty="0"/>
-              <a:t>Horários dos ataques dia 1</a:t>
-            </a:r>
-          </a:p>
-        </p:txBody>
-      </p:sp>
     </p:spTree>
     <p:extLst>
       <p:ext uri="{BB962C8B-B14F-4D97-AF65-F5344CB8AC3E}">
@@ -14533,10 +12997,10 @@
       </p:sp>
       <p:pic>
         <p:nvPicPr>
-          <p:cNvPr id="9" name="Espaço Reservado para Conteúdo 8">
+          <p:cNvPr id="6" name="Espaço Reservado para Conteúdo 5">
             <a:extLst>
               <a:ext uri="{FF2B5EF4-FFF2-40B4-BE49-F238E27FC236}">
-                <a16:creationId xmlns:a16="http://schemas.microsoft.com/office/drawing/2014/main" id="{79BD5215-A5F8-422A-92DD-06570DB8F3D1}"/>
+                <a16:creationId xmlns:a16="http://schemas.microsoft.com/office/drawing/2014/main" id="{5A68BCFA-D9FF-46D6-B44B-4F8E6C6DEB7B}"/>
               </a:ext>
             </a:extLst>
           </p:cNvPr>
@@ -14555,8 +13019,8 @@
         </p:blipFill>
         <p:spPr>
           <a:xfrm>
-            <a:off x="3290547" y="2646765"/>
-            <a:ext cx="5610905" cy="2076390"/>
+            <a:off x="3378986" y="2427323"/>
+            <a:ext cx="6351032" cy="2295831"/>
           </a:xfrm>
         </p:spPr>
       </p:pic>

</xml_diff>